<commit_message>
Update note méthodologique et présentation
</commit_message>
<xml_diff>
--- a/Jamadi_Omar_5_presentation_032023.pptx
+++ b/Jamadi_Omar_5_presentation_032023.pptx
@@ -5452,64 +5452,6 @@
           </a:p>
         </p:txBody>
       </p:sp>
-      <p:sp>
-        <p:nvSpPr>
-          <p:cNvPr id="17" name="ZoneTexte 16">
-            <a:extLst>
-              <a:ext uri="{FF2B5EF4-FFF2-40B4-BE49-F238E27FC236}">
-                <a16:creationId xmlns:a16="http://schemas.microsoft.com/office/drawing/2014/main" id="{E42F382B-C212-4808-1B2F-B17F2558C492}"/>
-              </a:ext>
-            </a:extLst>
-          </p:cNvPr>
-          <p:cNvSpPr txBox="1"/>
-          <p:nvPr/>
-        </p:nvSpPr>
-        <p:spPr>
-          <a:xfrm>
-            <a:off x="3324436" y="6154321"/>
-            <a:ext cx="5543128" cy="338554"/>
-          </a:xfrm>
-          <a:prstGeom prst="rect">
-            <a:avLst/>
-          </a:prstGeom>
-          <a:noFill/>
-        </p:spPr>
-        <p:txBody>
-          <a:bodyPr wrap="square">
-            <a:spAutoFit/>
-          </a:bodyPr>
-          <a:lstStyle/>
-          <a:p>
-            <a:r>
-              <a:rPr lang="fr-FR" sz="1600" dirty="0">
-                <a:latin typeface="Tahoma" panose="020B0604030504040204" pitchFamily="34" charset="0"/>
-                <a:ea typeface="Tahoma" panose="020B0604030504040204" pitchFamily="34" charset="0"/>
-                <a:cs typeface="Tahoma" panose="020B0604030504040204" pitchFamily="34" charset="0"/>
-              </a:rPr>
-              <a:t>Meilleurs résultats obtenus sur le jeu de </a:t>
-            </a:r>
-            <a:r>
-              <a:rPr lang="fr-FR" sz="1600" b="1" dirty="0">
-                <a:solidFill>
-                  <a:srgbClr val="632B8D"/>
-                </a:solidFill>
-                <a:latin typeface="Tahoma" panose="020B0604030504040204" pitchFamily="34" charset="0"/>
-                <a:ea typeface="Tahoma" panose="020B0604030504040204" pitchFamily="34" charset="0"/>
-                <a:cs typeface="Tahoma" panose="020B0604030504040204" pitchFamily="34" charset="0"/>
-              </a:rPr>
-              <a:t>151 variables </a:t>
-            </a:r>
-            <a:r>
-              <a:rPr lang="fr-FR" sz="1600" dirty="0">
-                <a:latin typeface="Tahoma" panose="020B0604030504040204" pitchFamily="34" charset="0"/>
-                <a:ea typeface="Tahoma" panose="020B0604030504040204" pitchFamily="34" charset="0"/>
-                <a:cs typeface="Tahoma" panose="020B0604030504040204" pitchFamily="34" charset="0"/>
-              </a:rPr>
-              <a:t> </a:t>
-            </a:r>
-          </a:p>
-        </p:txBody>
-      </p:sp>
     </p:spTree>
     <p:extLst>
       <p:ext uri="{BB962C8B-B14F-4D97-AF65-F5344CB8AC3E}">
@@ -5943,6 +5885,64 @@
           </a:p>
         </p:txBody>
       </p:sp>
+      <p:sp>
+        <p:nvSpPr>
+          <p:cNvPr id="5" name="ZoneTexte 4">
+            <a:extLst>
+              <a:ext uri="{FF2B5EF4-FFF2-40B4-BE49-F238E27FC236}">
+                <a16:creationId xmlns:a16="http://schemas.microsoft.com/office/drawing/2014/main" id="{D8F97A76-3372-408A-085C-F9D6C507FEDA}"/>
+              </a:ext>
+            </a:extLst>
+          </p:cNvPr>
+          <p:cNvSpPr txBox="1"/>
+          <p:nvPr/>
+        </p:nvSpPr>
+        <p:spPr>
+          <a:xfrm>
+            <a:off x="3324436" y="6396193"/>
+            <a:ext cx="5543128" cy="338554"/>
+          </a:xfrm>
+          <a:prstGeom prst="rect">
+            <a:avLst/>
+          </a:prstGeom>
+          <a:noFill/>
+        </p:spPr>
+        <p:txBody>
+          <a:bodyPr wrap="square">
+            <a:spAutoFit/>
+          </a:bodyPr>
+          <a:lstStyle/>
+          <a:p>
+            <a:r>
+              <a:rPr lang="fr-FR" sz="1600" dirty="0">
+                <a:latin typeface="Tahoma" panose="020B0604030504040204" pitchFamily="34" charset="0"/>
+                <a:ea typeface="Tahoma" panose="020B0604030504040204" pitchFamily="34" charset="0"/>
+                <a:cs typeface="Tahoma" panose="020B0604030504040204" pitchFamily="34" charset="0"/>
+              </a:rPr>
+              <a:t>Meilleurs résultats obtenus sur le jeu de </a:t>
+            </a:r>
+            <a:r>
+              <a:rPr lang="fr-FR" sz="1600" b="1" dirty="0">
+                <a:solidFill>
+                  <a:srgbClr val="632B8D"/>
+                </a:solidFill>
+                <a:latin typeface="Tahoma" panose="020B0604030504040204" pitchFamily="34" charset="0"/>
+                <a:ea typeface="Tahoma" panose="020B0604030504040204" pitchFamily="34" charset="0"/>
+                <a:cs typeface="Tahoma" panose="020B0604030504040204" pitchFamily="34" charset="0"/>
+              </a:rPr>
+              <a:t>151 variables </a:t>
+            </a:r>
+            <a:r>
+              <a:rPr lang="fr-FR" sz="1600" dirty="0">
+                <a:latin typeface="Tahoma" panose="020B0604030504040204" pitchFamily="34" charset="0"/>
+                <a:ea typeface="Tahoma" panose="020B0604030504040204" pitchFamily="34" charset="0"/>
+                <a:cs typeface="Tahoma" panose="020B0604030504040204" pitchFamily="34" charset="0"/>
+              </a:rPr>
+              <a:t> </a:t>
+            </a:r>
+          </a:p>
+        </p:txBody>
+      </p:sp>
     </p:spTree>
     <p:extLst>
       <p:ext uri="{BB962C8B-B14F-4D97-AF65-F5344CB8AC3E}">
@@ -7685,122 +7685,6 @@
                 <a:cs typeface="Tahoma" panose="020B0604030504040204" pitchFamily="34" charset="0"/>
               </a:rPr>
               <a:t> </a:t>
-            </a:r>
-          </a:p>
-        </p:txBody>
-      </p:sp>
-      <p:sp>
-        <p:nvSpPr>
-          <p:cNvPr id="10" name="Flèche : droite 9">
-            <a:extLst>
-              <a:ext uri="{FF2B5EF4-FFF2-40B4-BE49-F238E27FC236}">
-                <a16:creationId xmlns:a16="http://schemas.microsoft.com/office/drawing/2014/main" id="{778FB2F0-DCEA-E248-5DAE-0E9D8AA6FDF5}"/>
-              </a:ext>
-            </a:extLst>
-          </p:cNvPr>
-          <p:cNvSpPr/>
-          <p:nvPr/>
-        </p:nvSpPr>
-        <p:spPr>
-          <a:xfrm>
-            <a:off x="2743199" y="6159120"/>
-            <a:ext cx="580937" cy="338554"/>
-          </a:xfrm>
-          <a:prstGeom prst="rightArrow">
-            <a:avLst/>
-          </a:prstGeom>
-          <a:solidFill>
-            <a:srgbClr val="632B8D"/>
-          </a:solidFill>
-          <a:ln>
-            <a:solidFill>
-              <a:srgbClr val="632B8D"/>
-            </a:solidFill>
-          </a:ln>
-        </p:spPr>
-        <p:style>
-          <a:lnRef idx="2">
-            <a:schemeClr val="accent1">
-              <a:shade val="50000"/>
-            </a:schemeClr>
-          </a:lnRef>
-          <a:fillRef idx="1">
-            <a:schemeClr val="accent1"/>
-          </a:fillRef>
-          <a:effectRef idx="0">
-            <a:schemeClr val="accent1"/>
-          </a:effectRef>
-          <a:fontRef idx="minor">
-            <a:schemeClr val="lt1"/>
-          </a:fontRef>
-        </p:style>
-        <p:txBody>
-          <a:bodyPr rtlCol="0" anchor="ctr"/>
-          <a:lstStyle/>
-          <a:p>
-            <a:pPr algn="ctr"/>
-            <a:endParaRPr lang="fr-FR" dirty="0"/>
-          </a:p>
-        </p:txBody>
-      </p:sp>
-      <p:sp>
-        <p:nvSpPr>
-          <p:cNvPr id="11" name="ZoneTexte 10">
-            <a:extLst>
-              <a:ext uri="{FF2B5EF4-FFF2-40B4-BE49-F238E27FC236}">
-                <a16:creationId xmlns:a16="http://schemas.microsoft.com/office/drawing/2014/main" id="{B5659D93-4128-AD75-C802-D30637ACF292}"/>
-              </a:ext>
-            </a:extLst>
-          </p:cNvPr>
-          <p:cNvSpPr txBox="1"/>
-          <p:nvPr/>
-        </p:nvSpPr>
-        <p:spPr>
-          <a:xfrm>
-            <a:off x="3588743" y="6159120"/>
-            <a:ext cx="5014514" cy="338554"/>
-          </a:xfrm>
-          <a:prstGeom prst="rect">
-            <a:avLst/>
-          </a:prstGeom>
-          <a:noFill/>
-        </p:spPr>
-        <p:txBody>
-          <a:bodyPr wrap="none" rtlCol="0">
-            <a:spAutoFit/>
-          </a:bodyPr>
-          <a:lstStyle/>
-          <a:p>
-            <a:pPr algn="l"/>
-            <a:r>
-              <a:rPr kumimoji="0" lang="fr-FR" sz="1600" b="1" i="0" u="none" strike="noStrike" cap="none" normalizeH="0" baseline="0" dirty="0">
-                <a:ln>
-                  <a:noFill/>
-                </a:ln>
-                <a:solidFill>
-                  <a:srgbClr val="632B8D"/>
-                </a:solidFill>
-                <a:effectLst/>
-                <a:latin typeface="Tahoma" panose="020B0604030504040204" pitchFamily="34" charset="0"/>
-                <a:ea typeface="Tahoma" panose="020B0604030504040204" pitchFamily="34" charset="0"/>
-                <a:cs typeface="Tahoma" panose="020B0604030504040204" pitchFamily="34" charset="0"/>
-              </a:rPr>
-              <a:t>évaluation des performances</a:t>
-            </a:r>
-            <a:r>
-              <a:rPr kumimoji="0" lang="fr-FR" sz="1600" b="0" i="0" u="none" strike="noStrike" cap="none" normalizeH="0" baseline="0" dirty="0">
-                <a:ln>
-                  <a:noFill/>
-                </a:ln>
-                <a:solidFill>
-                  <a:srgbClr val="080808"/>
-                </a:solidFill>
-                <a:effectLst/>
-                <a:latin typeface="Tahoma" panose="020B0604030504040204" pitchFamily="34" charset="0"/>
-                <a:ea typeface="Tahoma" panose="020B0604030504040204" pitchFamily="34" charset="0"/>
-                <a:cs typeface="Tahoma" panose="020B0604030504040204" pitchFamily="34" charset="0"/>
-              </a:rPr>
-              <a:t> du modèle optimisé</a:t>
             </a:r>
           </a:p>
         </p:txBody>
@@ -14661,7 +14545,7 @@
                 <a:ea typeface="Tahoma" panose="020B0604030504040204" pitchFamily="34" charset="0"/>
                 <a:cs typeface="Tahoma" panose="020B0604030504040204" pitchFamily="34" charset="0"/>
               </a:rPr>
-              <a:t>métrique ROC AUC</a:t>
+              <a:t>métrique AUC ROC</a:t>
             </a:r>
             <a:r>
               <a:rPr lang="fr-FR" sz="1600" dirty="0">

</xml_diff>